<commit_message>
slides updated with the new bid function condition
</commit_message>
<xml_diff>
--- a/Digital Art Solutions.pptx
+++ b/Digital Art Solutions.pptx
@@ -117,7 +117,7 @@
 <file path=ppt/revisionInfo.xml><?xml version="1.0" encoding="utf-8"?>
 <p1510:revInfo xmlns:a="http://schemas.openxmlformats.org/drawingml/2006/main" xmlns:r="http://schemas.openxmlformats.org/officeDocument/2006/relationships" xmlns:p1510="http://schemas.microsoft.com/office/powerpoint/2015/10/main">
   <p1510:revLst>
-    <p1510:client id="{9648910E-5F28-4431-A91B-D781C6A6B747}" v="1172" dt="2023-05-11T14:07:03.364"/>
+    <p1510:client id="{9648910E-5F28-4431-A91B-D781C6A6B747}" v="1315" dt="2023-05-12T02:26:21.774"/>
   </p1510:revLst>
 </p1510:revInfo>
 </file>
@@ -127,7 +127,7 @@
   <pc:docChgLst>
     <pc:chgData name="b d" userId="d8a693ecc95ea58f" providerId="LiveId" clId="{9648910E-5F28-4431-A91B-D781C6A6B747}"/>
     <pc:docChg chg="undo custSel delSld modSld">
-      <pc:chgData name="b d" userId="d8a693ecc95ea58f" providerId="LiveId" clId="{9648910E-5F28-4431-A91B-D781C6A6B747}" dt="2023-05-11T14:07:40.492" v="1214" actId="20577"/>
+      <pc:chgData name="b d" userId="d8a693ecc95ea58f" providerId="LiveId" clId="{9648910E-5F28-4431-A91B-D781C6A6B747}" dt="2023-05-12T02:26:21.774" v="1354" actId="20577"/>
       <pc:docMkLst>
         <pc:docMk/>
       </pc:docMkLst>
@@ -154,7 +154,7 @@
         </pc:sldMkLst>
       </pc:sldChg>
       <pc:sldChg chg="addSp modSp mod">
-        <pc:chgData name="b d" userId="d8a693ecc95ea58f" providerId="LiveId" clId="{9648910E-5F28-4431-A91B-D781C6A6B747}" dt="2023-05-11T14:07:03.359" v="1213" actId="113"/>
+        <pc:chgData name="b d" userId="d8a693ecc95ea58f" providerId="LiveId" clId="{9648910E-5F28-4431-A91B-D781C6A6B747}" dt="2023-05-12T02:26:21.774" v="1354" actId="20577"/>
         <pc:sldMkLst>
           <pc:docMk/>
           <pc:sldMk cId="1800016780" sldId="259"/>
@@ -168,7 +168,7 @@
           </ac:spMkLst>
         </pc:spChg>
         <pc:graphicFrameChg chg="mod modGraphic">
-          <ac:chgData name="b d" userId="d8a693ecc95ea58f" providerId="LiveId" clId="{9648910E-5F28-4431-A91B-D781C6A6B747}" dt="2023-05-11T14:07:03.359" v="1213" actId="113"/>
+          <ac:chgData name="b d" userId="d8a693ecc95ea58f" providerId="LiveId" clId="{9648910E-5F28-4431-A91B-D781C6A6B747}" dt="2023-05-12T02:26:21.774" v="1354" actId="20577"/>
           <ac:graphicFrameMkLst>
             <pc:docMk/>
             <pc:sldMk cId="1800016780" sldId="259"/>
@@ -2281,7 +2281,7 @@
           </a:r>
           <a:r>
             <a:rPr lang="en-US" b="0" i="0" baseline="0" dirty="0"/>
-            <a:t> and their initial values, such as the token (NFT Registry smart contract), token Id, highest bid, Auction end time. </a:t>
+            <a:t> and their initial values, such as the token (NFT Registry smart contract), token Id, highest bid, auction end time. </a:t>
           </a:r>
           <a:r>
             <a:rPr lang="en-US" b="0" i="1" u="none" baseline="0" dirty="0"/>
@@ -2289,7 +2289,7 @@
           </a:r>
           <a:r>
             <a:rPr lang="en-US" b="0" i="0" baseline="0" dirty="0"/>
-            <a:t> for initiation – Auction is not in progress; Initiated by the NFT Seller only.</a:t>
+            <a:t> for initiation – auction is not in progress; Initiated by the NFT Seller only.</a:t>
           </a:r>
           <a:endParaRPr lang="en-US" dirty="0"/>
         </a:p>
@@ -2357,7 +2357,7 @@
           </a:r>
           <a:r>
             <a:rPr lang="en-US" b="0" i="0" baseline="0" dirty="0"/>
-            <a:t> for initiation – Auction is in progress; bidder’s balance is higher than the bid.</a:t>
+            <a:t> for initiation – auction is in progress; a bidder’s balance must be higher than the bid; the seller cannot place bids.</a:t>
           </a:r>
           <a:endParaRPr lang="en-US" dirty="0"/>
         </a:p>
@@ -2485,7 +2485,7 @@
           </a:r>
           <a:r>
             <a:rPr lang="en-US" b="0" i="0" baseline="0" dirty="0"/>
-            <a:t>. The function checks the amount of the bid and transfers it back to the bidder's address. Withdrawals are allowed during and after the Auction period.</a:t>
+            <a:t>. The function checks the amount of the bid and transfers it back to the bidder's address. Withdrawals are allowed during and after the auction period.</a:t>
           </a:r>
           <a:endParaRPr lang="en-US" dirty="0"/>
         </a:p>
@@ -2696,7 +2696,7 @@
       <dgm:spPr/>
     </dgm:pt>
     <dgm:pt modelId="{21334611-4C75-4183-8585-5A0FDF696521}" type="pres">
-      <dgm:prSet presAssocID="{CDAA5682-53B8-4162-A759-27FF490D3EA0}" presName="bgRect" presStyleLbl="bgShp" presStyleIdx="1" presStyleCnt="2" custScaleX="68609" custScaleY="102476" custLinFactNeighborX="-8703" custLinFactNeighborY="-2144"/>
+      <dgm:prSet presAssocID="{CDAA5682-53B8-4162-A759-27FF490D3EA0}" presName="bgRect" presStyleLbl="bgShp" presStyleIdx="1" presStyleCnt="2" custScaleX="68609" custScaleY="102476" custLinFactNeighborX="-10023" custLinFactNeighborY="-2144"/>
       <dgm:spPr/>
     </dgm:pt>
     <dgm:pt modelId="{CAEE0621-7AF4-442B-8893-A7CE7B7C9FB3}" type="pres">
@@ -3502,7 +3502,7 @@
           </a:r>
           <a:r>
             <a:rPr lang="en-US" sz="1100" b="0" i="0" kern="1200" baseline="0" dirty="0"/>
-            <a:t> and their initial values, such as the token (NFT Registry smart contract), token Id, highest bid, Auction end time. </a:t>
+            <a:t> and their initial values, such as the token (NFT Registry smart contract), token Id, highest bid, auction end time. </a:t>
           </a:r>
           <a:r>
             <a:rPr lang="en-US" sz="1100" b="0" i="1" u="none" kern="1200" baseline="0" dirty="0"/>
@@ -3510,7 +3510,7 @@
           </a:r>
           <a:r>
             <a:rPr lang="en-US" sz="1100" b="0" i="0" kern="1200" baseline="0" dirty="0"/>
-            <a:t> for initiation – Auction is not in progress; Initiated by the NFT Seller only.</a:t>
+            <a:t> for initiation – auction is not in progress; Initiated by the NFT Seller only.</a:t>
           </a:r>
           <a:endParaRPr lang="en-US" sz="1100" kern="1200" dirty="0"/>
         </a:p>
@@ -3555,7 +3555,7 @@
           </a:r>
           <a:r>
             <a:rPr lang="en-US" sz="1100" b="0" i="0" kern="1200" baseline="0" dirty="0"/>
-            <a:t> for initiation – Auction is in progress; bidder’s balance is higher than the bid.</a:t>
+            <a:t> for initiation – auction is in progress; a bidder’s balance must be higher than the bid; the seller cannot place bids.</a:t>
           </a:r>
           <a:endParaRPr lang="en-US" sz="1100" kern="1200" dirty="0"/>
         </a:p>
@@ -3637,7 +3637,7 @@
           </a:r>
           <a:r>
             <a:rPr lang="en-US" sz="1100" b="0" i="0" kern="1200" baseline="0" dirty="0"/>
-            <a:t>. The function checks the amount of the bid and transfers it back to the bidder's address. Withdrawals are allowed during and after the Auction period.</a:t>
+            <a:t>. The function checks the amount of the bid and transfers it back to the bidder's address. Withdrawals are allowed during and after the auction period.</a:t>
           </a:r>
           <a:endParaRPr lang="en-US" sz="1100" kern="1200" dirty="0"/>
         </a:p>
@@ -3683,7 +3683,7 @@
       </dsp:nvSpPr>
       <dsp:spPr>
         <a:xfrm>
-          <a:off x="110371" y="2294463"/>
+          <a:off x="15137" y="2294463"/>
           <a:ext cx="4949897" cy="1335111"/>
         </a:xfrm>
         <a:prstGeom prst="roundRect">
@@ -10424,7 +10424,7 @@
           <p:nvPr>
             <p:extLst>
               <p:ext uri="{D42A27DB-BD31-4B8C-83A1-F6EECF244321}">
-                <p14:modId xmlns:p14="http://schemas.microsoft.com/office/powerpoint/2010/main" val="1228774675"/>
+                <p14:modId xmlns:p14="http://schemas.microsoft.com/office/powerpoint/2010/main" val="2353654667"/>
               </p:ext>
             </p:extLst>
           </p:nvPr>

</xml_diff>

<commit_message>
icons of the slides modifid
</commit_message>
<xml_diff>
--- a/Digital Art Solutions.pptx
+++ b/Digital Art Solutions.pptx
@@ -121,7 +121,7 @@
 <file path=ppt/revisionInfo.xml><?xml version="1.0" encoding="utf-8"?>
 <p1510:revInfo xmlns:a="http://schemas.openxmlformats.org/drawingml/2006/main" xmlns:r="http://schemas.openxmlformats.org/officeDocument/2006/relationships" xmlns:p1510="http://schemas.microsoft.com/office/powerpoint/2015/10/main">
   <p1510:revLst>
-    <p1510:client id="{2AD4B4F2-9A8D-4F93-BE81-9B174DA180E8}" v="1368" dt="2023-05-15T15:16:56.477"/>
+    <p1510:client id="{2AD4B4F2-9A8D-4F93-BE81-9B174DA180E8}" v="1377" dt="2023-05-16T15:54:23.441"/>
   </p1510:revLst>
 </p1510:revInfo>
 </file>
@@ -131,7 +131,7 @@
   <pc:docChgLst>
     <pc:chgData name="b d" userId="d8a693ecc95ea58f" providerId="LiveId" clId="{2AD4B4F2-9A8D-4F93-BE81-9B174DA180E8}"/>
     <pc:docChg chg="undo custSel addSld modSld sldOrd">
-      <pc:chgData name="b d" userId="d8a693ecc95ea58f" providerId="LiveId" clId="{2AD4B4F2-9A8D-4F93-BE81-9B174DA180E8}" dt="2023-05-15T15:37:48.270" v="2247" actId="20577"/>
+      <pc:chgData name="b d" userId="d8a693ecc95ea58f" providerId="LiveId" clId="{2AD4B4F2-9A8D-4F93-BE81-9B174DA180E8}" dt="2023-05-16T15:54:23.441" v="2260"/>
       <pc:docMkLst>
         <pc:docMk/>
       </pc:docMkLst>
@@ -159,7 +159,7 @@
         </pc:spChg>
       </pc:sldChg>
       <pc:sldChg chg="modSp add mod">
-        <pc:chgData name="b d" userId="d8a693ecc95ea58f" providerId="LiveId" clId="{2AD4B4F2-9A8D-4F93-BE81-9B174DA180E8}" dt="2023-05-15T15:22:37.305" v="2161" actId="2711"/>
+        <pc:chgData name="b d" userId="d8a693ecc95ea58f" providerId="LiveId" clId="{2AD4B4F2-9A8D-4F93-BE81-9B174DA180E8}" dt="2023-05-16T15:54:23.441" v="2260"/>
         <pc:sldMkLst>
           <pc:docMk/>
           <pc:sldMk cId="679611928" sldId="258"/>
@@ -173,7 +173,7 @@
           </ac:spMkLst>
         </pc:spChg>
         <pc:graphicFrameChg chg="mod">
-          <ac:chgData name="b d" userId="d8a693ecc95ea58f" providerId="LiveId" clId="{2AD4B4F2-9A8D-4F93-BE81-9B174DA180E8}" dt="2023-05-15T15:16:54.679" v="2117" actId="20577"/>
+          <ac:chgData name="b d" userId="d8a693ecc95ea58f" providerId="LiveId" clId="{2AD4B4F2-9A8D-4F93-BE81-9B174DA180E8}" dt="2023-05-16T15:54:23.441" v="2260"/>
           <ac:graphicFrameMkLst>
             <pc:docMk/>
             <pc:sldMk cId="679611928" sldId="258"/>
@@ -181,8 +181,55 @@
           </ac:graphicFrameMkLst>
         </pc:graphicFrameChg>
       </pc:sldChg>
+      <pc:sldChg chg="addSp delSp modSp mod setBg setClrOvrMap">
+        <pc:chgData name="b d" userId="d8a693ecc95ea58f" providerId="LiveId" clId="{2AD4B4F2-9A8D-4F93-BE81-9B174DA180E8}" dt="2023-05-16T15:47:01.753" v="2252"/>
+        <pc:sldMkLst>
+          <pc:docMk/>
+          <pc:sldMk cId="1800016780" sldId="259"/>
+        </pc:sldMkLst>
+        <pc:spChg chg="mod">
+          <ac:chgData name="b d" userId="d8a693ecc95ea58f" providerId="LiveId" clId="{2AD4B4F2-9A8D-4F93-BE81-9B174DA180E8}" dt="2023-05-16T15:46:31.311" v="2251" actId="26606"/>
+          <ac:spMkLst>
+            <pc:docMk/>
+            <pc:sldMk cId="1800016780" sldId="259"/>
+            <ac:spMk id="2" creationId="{C2B3D22C-836B-C84B-4B28-672653A87BE8}"/>
+          </ac:spMkLst>
+        </pc:spChg>
+        <pc:spChg chg="add del">
+          <ac:chgData name="b d" userId="d8a693ecc95ea58f" providerId="LiveId" clId="{2AD4B4F2-9A8D-4F93-BE81-9B174DA180E8}" dt="2023-05-16T15:46:25.028" v="2249" actId="26606"/>
+          <ac:spMkLst>
+            <pc:docMk/>
+            <pc:sldMk cId="1800016780" sldId="259"/>
+            <ac:spMk id="10" creationId="{6C4028FD-8BAA-4A19-BFDE-594D991B7552}"/>
+          </ac:spMkLst>
+        </pc:spChg>
+        <pc:spChg chg="add del">
+          <ac:chgData name="b d" userId="d8a693ecc95ea58f" providerId="LiveId" clId="{2AD4B4F2-9A8D-4F93-BE81-9B174DA180E8}" dt="2023-05-16T15:46:31.311" v="2251" actId="26606"/>
+          <ac:spMkLst>
+            <pc:docMk/>
+            <pc:sldMk cId="1800016780" sldId="259"/>
+            <ac:spMk id="11" creationId="{9228552E-C8B1-4A80-8448-0787CE0FC704}"/>
+          </ac:spMkLst>
+        </pc:spChg>
+        <pc:graphicFrameChg chg="mod modGraphic">
+          <ac:chgData name="b d" userId="d8a693ecc95ea58f" providerId="LiveId" clId="{2AD4B4F2-9A8D-4F93-BE81-9B174DA180E8}" dt="2023-05-16T15:47:01.753" v="2252"/>
+          <ac:graphicFrameMkLst>
+            <pc:docMk/>
+            <pc:sldMk cId="1800016780" sldId="259"/>
+            <ac:graphicFrameMk id="5" creationId="{E9DAC7D0-FC74-B73D-A277-378F7AA168A0}"/>
+          </ac:graphicFrameMkLst>
+        </pc:graphicFrameChg>
+        <pc:picChg chg="add del">
+          <ac:chgData name="b d" userId="d8a693ecc95ea58f" providerId="LiveId" clId="{2AD4B4F2-9A8D-4F93-BE81-9B174DA180E8}" dt="2023-05-16T15:46:31.311" v="2251" actId="26606"/>
+          <ac:picMkLst>
+            <pc:docMk/>
+            <pc:sldMk cId="1800016780" sldId="259"/>
+            <ac:picMk id="7" creationId="{1DD0AC26-EB33-9031-5D2D-069982E152C7}"/>
+          </ac:picMkLst>
+        </pc:picChg>
+      </pc:sldChg>
       <pc:sldChg chg="modSp mod">
-        <pc:chgData name="b d" userId="d8a693ecc95ea58f" providerId="LiveId" clId="{2AD4B4F2-9A8D-4F93-BE81-9B174DA180E8}" dt="2023-05-15T15:23:14.548" v="2163" actId="2711"/>
+        <pc:chgData name="b d" userId="d8a693ecc95ea58f" providerId="LiveId" clId="{2AD4B4F2-9A8D-4F93-BE81-9B174DA180E8}" dt="2023-05-16T15:50:15.007" v="2257"/>
         <pc:sldMkLst>
           <pc:docMk/>
           <pc:sldMk cId="1528351146" sldId="260"/>
@@ -196,7 +243,7 @@
           </ac:spMkLst>
         </pc:spChg>
         <pc:graphicFrameChg chg="mod modGraphic">
-          <ac:chgData name="b d" userId="d8a693ecc95ea58f" providerId="LiveId" clId="{2AD4B4F2-9A8D-4F93-BE81-9B174DA180E8}" dt="2023-05-15T15:17:41.193" v="2122" actId="207"/>
+          <ac:chgData name="b d" userId="d8a693ecc95ea58f" providerId="LiveId" clId="{2AD4B4F2-9A8D-4F93-BE81-9B174DA180E8}" dt="2023-05-16T15:50:15.007" v="2257"/>
           <ac:graphicFrameMkLst>
             <pc:docMk/>
             <pc:sldMk cId="1528351146" sldId="260"/>
@@ -205,7 +252,7 @@
         </pc:graphicFrameChg>
       </pc:sldChg>
       <pc:sldChg chg="modSp add mod">
-        <pc:chgData name="b d" userId="d8a693ecc95ea58f" providerId="LiveId" clId="{2AD4B4F2-9A8D-4F93-BE81-9B174DA180E8}" dt="2023-05-14T00:48:30.702" v="1347" actId="20577"/>
+        <pc:chgData name="b d" userId="d8a693ecc95ea58f" providerId="LiveId" clId="{2AD4B4F2-9A8D-4F93-BE81-9B174DA180E8}" dt="2023-05-16T15:48:38.834" v="2255"/>
         <pc:sldMkLst>
           <pc:docMk/>
           <pc:sldMk cId="1679028479" sldId="261"/>
@@ -219,7 +266,7 @@
           </ac:spMkLst>
         </pc:spChg>
         <pc:graphicFrameChg chg="mod">
-          <ac:chgData name="b d" userId="d8a693ecc95ea58f" providerId="LiveId" clId="{2AD4B4F2-9A8D-4F93-BE81-9B174DA180E8}" dt="2023-05-14T00:48:30.702" v="1347" actId="20577"/>
+          <ac:chgData name="b d" userId="d8a693ecc95ea58f" providerId="LiveId" clId="{2AD4B4F2-9A8D-4F93-BE81-9B174DA180E8}" dt="2023-05-16T15:48:38.834" v="2255"/>
           <ac:graphicFrameMkLst>
             <pc:docMk/>
             <pc:sldMk cId="1679028479" sldId="261"/>
@@ -4562,6 +4609,9 @@
         <a:blipFill>
           <a:blip xmlns:r="http://schemas.openxmlformats.org/officeDocument/2006/relationships" r:embed="rId1">
             <a:extLst>
+              <a:ext uri="{28A0092B-C50C-407E-A947-70E740481C1C}">
+                <a14:useLocalDpi xmlns:a14="http://schemas.microsoft.com/office/drawing/2010/main" val="0"/>
+              </a:ext>
               <a:ext uri="{96DAC541-7B7A-43D3-8B79-37D633B846F1}">
                 <asvg:svgBlip xmlns:asvg="http://schemas.microsoft.com/office/drawing/2016/SVG/main" r:embed="rId2"/>
               </a:ext>
@@ -4575,7 +4625,7 @@
       </dgm:spPr>
       <dgm:extLst>
         <a:ext uri="{E40237B7-FDA0-4F09-8148-C483321AD2D9}">
-          <dgm14:cNvPr xmlns:dgm14="http://schemas.microsoft.com/office/drawing/2010/diagram" id="0" name="" descr="Coins outline"/>
+          <dgm14:cNvPr xmlns:dgm14="http://schemas.microsoft.com/office/drawing/2010/diagram" id="0" name="" descr="Palette with solid fill"/>
         </a:ext>
       </dgm:extLst>
     </dgm:pt>
@@ -4708,7 +4758,7 @@
             </a:lnSpc>
           </a:pPr>
           <a:r>
-            <a:rPr lang="en-US" b="0" i="0" baseline="0" dirty="0"/>
+            <a:rPr lang="en-US" b="0" i="0" baseline="0"/>
             <a:t>A Solidity based Auction smart contract enables participants to bid on an NFT, with the highest bidder winning the auction. The building blocks of the Auction smart contract include:</a:t>
           </a:r>
           <a:endParaRPr lang="en-US" dirty="0"/>
@@ -4750,7 +4800,7 @@
             </a:lnSpc>
           </a:pPr>
           <a:r>
-            <a:rPr lang="en-US" b="1" i="0" baseline="0" dirty="0">
+            <a:rPr lang="en-US" b="1" i="0" baseline="0">
               <a:solidFill>
                 <a:schemeClr val="accent2">
                   <a:lumMod val="75000"/>
@@ -4760,23 +4810,23 @@
             <a:t>Start Function:</a:t>
           </a:r>
           <a:r>
-            <a:rPr lang="en-US" b="0" i="0" baseline="0" dirty="0"/>
+            <a:rPr lang="en-US" b="0" i="0" baseline="0"/>
             <a:t> Defines the contract's </a:t>
           </a:r>
           <a:r>
-            <a:rPr lang="en-US" b="0" i="1" baseline="0" dirty="0"/>
+            <a:rPr lang="en-US" b="0" i="1" baseline="0"/>
             <a:t>variables</a:t>
           </a:r>
           <a:r>
-            <a:rPr lang="en-US" b="0" i="0" baseline="0" dirty="0"/>
+            <a:rPr lang="en-US" b="0" i="0" baseline="0"/>
             <a:t> and their initial values, such as the token (NFT Registry smart contract), token Id, highest bid, auction end time. </a:t>
           </a:r>
           <a:r>
-            <a:rPr lang="en-US" b="0" i="1" u="none" baseline="0" dirty="0"/>
+            <a:rPr lang="en-US" b="0" i="1" u="none" baseline="0"/>
             <a:t>Conditions</a:t>
           </a:r>
           <a:r>
-            <a:rPr lang="en-US" b="0" i="0" baseline="0" dirty="0"/>
+            <a:rPr lang="en-US" b="0" i="0" baseline="0"/>
             <a:t> for initiation – auction is not in progress; Initiated by the NFT Seller only.</a:t>
           </a:r>
           <a:endParaRPr lang="en-US" dirty="0"/>
@@ -4818,7 +4868,7 @@
             </a:lnSpc>
           </a:pPr>
           <a:r>
-            <a:rPr lang="en-US" b="1" i="0" baseline="0" dirty="0">
+            <a:rPr lang="en-US" b="1" i="0" baseline="0">
               <a:solidFill>
                 <a:schemeClr val="accent2">
                   <a:lumMod val="75000"/>
@@ -4828,7 +4878,7 @@
             <a:t>Bid Function: </a:t>
           </a:r>
           <a:r>
-            <a:rPr lang="en-US" b="0" i="0" baseline="0" dirty="0">
+            <a:rPr lang="en-US" b="0" i="0" baseline="0">
               <a:solidFill>
                 <a:schemeClr val="tx1"/>
               </a:solidFill>
@@ -4836,15 +4886,15 @@
             <a:t>A</a:t>
           </a:r>
           <a:r>
-            <a:rPr lang="en-US" b="0" i="0" baseline="0" dirty="0"/>
+            <a:rPr lang="en-US" b="0" i="0" baseline="0"/>
             <a:t>llows participants to place bids on the auction. When a bid is made, the function verifies that the bid amount is greater than the current highest bid and updates the highest bid and bidder accordingly. </a:t>
           </a:r>
           <a:r>
-            <a:rPr lang="en-US" b="0" i="1" u="none" baseline="0" dirty="0"/>
+            <a:rPr lang="en-US" b="0" i="1" u="none" baseline="0"/>
             <a:t>Conditions</a:t>
           </a:r>
           <a:r>
-            <a:rPr lang="en-US" b="0" i="0" baseline="0" dirty="0"/>
+            <a:rPr lang="en-US" b="0" i="0" baseline="0"/>
             <a:t> for initiation – auction is in progress; a bidder’s balance must be higher than the bid; the seller cannot place bids.</a:t>
           </a:r>
           <a:endParaRPr lang="en-US" dirty="0"/>
@@ -4886,7 +4936,7 @@
             </a:lnSpc>
           </a:pPr>
           <a:r>
-            <a:rPr lang="en-US" b="1" i="0" baseline="0" dirty="0">
+            <a:rPr lang="en-US" b="1" i="0" baseline="0">
               <a:solidFill>
                 <a:schemeClr val="accent2">
                   <a:lumMod val="75000"/>
@@ -4896,15 +4946,15 @@
             <a:t>End Function:</a:t>
           </a:r>
           <a:r>
-            <a:rPr lang="en-US" b="0" i="0" baseline="0" dirty="0"/>
+            <a:rPr lang="en-US" b="0" i="0" baseline="0"/>
             <a:t> Ends the auction after the pre-defined period. When the function is called, it </a:t>
           </a:r>
           <a:r>
-            <a:rPr lang="en-US" b="0" i="1" baseline="0" dirty="0"/>
+            <a:rPr lang="en-US" b="0" i="1" baseline="0"/>
             <a:t>checks if the bidding period has ended</a:t>
           </a:r>
           <a:r>
-            <a:rPr lang="en-US" b="0" i="0" baseline="0" dirty="0"/>
+            <a:rPr lang="en-US" b="0" i="0" baseline="0"/>
             <a:t>. It then transfers the highest bid amount to the Seller’s address and the NFT token to the highest bidder. If there are no bids, the NFT will be returned to the Seller. After the transfers, the function marks the auction as ended.</a:t>
           </a:r>
           <a:endParaRPr lang="en-US" dirty="0"/>
@@ -4946,7 +4996,7 @@
             </a:lnSpc>
           </a:pPr>
           <a:r>
-            <a:rPr lang="en-US" b="1" i="0" baseline="0" dirty="0">
+            <a:rPr lang="en-US" b="1" i="0" baseline="0">
               <a:solidFill>
                 <a:schemeClr val="accent2">
                   <a:lumMod val="75000"/>
@@ -4956,7 +5006,7 @@
             <a:t>Withdraw Function: </a:t>
           </a:r>
           <a:r>
-            <a:rPr lang="en-US" b="0" i="0" baseline="0" dirty="0">
+            <a:rPr lang="en-US" b="0" i="0" baseline="0">
               <a:solidFill>
                 <a:schemeClr val="tx1"/>
               </a:solidFill>
@@ -4964,15 +5014,15 @@
             <a:t>A</a:t>
           </a:r>
           <a:r>
-            <a:rPr lang="en-US" b="0" i="0" baseline="0" dirty="0"/>
+            <a:rPr lang="en-US" b="0" i="0" baseline="0"/>
             <a:t>llows bidders to withdraw their bids if they </a:t>
           </a:r>
           <a:r>
-            <a:rPr lang="en-US" b="0" i="1" baseline="0" dirty="0"/>
+            <a:rPr lang="en-US" b="0" i="1" baseline="0"/>
             <a:t>are not the highest bidder</a:t>
           </a:r>
           <a:r>
-            <a:rPr lang="en-US" b="0" i="0" baseline="0" dirty="0"/>
+            <a:rPr lang="en-US" b="0" i="0" baseline="0"/>
             <a:t>. The function checks the amount of the bid and transfers it back to the bidder's address. Withdrawals are allowed during and after the auction period.</a:t>
           </a:r>
           <a:endParaRPr lang="en-US" dirty="0"/>
@@ -5014,7 +5064,7 @@
             </a:lnSpc>
           </a:pPr>
           <a:r>
-            <a:rPr lang="en-US" b="1" i="0" baseline="0" dirty="0">
+            <a:rPr lang="en-US" b="1" i="0" baseline="0">
               <a:solidFill>
                 <a:schemeClr val="accent2">
                   <a:lumMod val="75000"/>
@@ -5024,7 +5074,7 @@
             <a:t>Event Emission: </a:t>
           </a:r>
           <a:r>
-            <a:rPr lang="en-US" b="0" i="0" baseline="0" dirty="0"/>
+            <a:rPr lang="en-US" b="0" i="0" baseline="0"/>
             <a:t>Each function above emits an event that allows to track the auction's progress and enables users to monitor different stages of the auction.</a:t>
           </a:r>
           <a:endParaRPr lang="en-US" dirty="0"/>
@@ -5066,11 +5116,11 @@
             </a:lnSpc>
           </a:pPr>
           <a:r>
-            <a:rPr lang="en-US" b="1" i="0" baseline="0" dirty="0"/>
+            <a:rPr lang="en-US" b="1" i="0" baseline="0"/>
             <a:t>Admin</a:t>
           </a:r>
           <a:r>
-            <a:rPr lang="en-US" b="0" i="0" baseline="0" dirty="0"/>
+            <a:rPr lang="en-US" b="0" i="0" baseline="0"/>
             <a:t>: NFT Seller is the administrator</a:t>
           </a:r>
         </a:p>
@@ -5081,11 +5131,11 @@
             </a:lnSpc>
           </a:pPr>
           <a:r>
-            <a:rPr lang="en-US" b="1" i="0" baseline="0" dirty="0"/>
+            <a:rPr lang="en-US" b="1" i="0" baseline="0"/>
             <a:t>Deployment</a:t>
           </a:r>
           <a:r>
-            <a:rPr lang="en-US" b="0" i="0" baseline="0" dirty="0"/>
+            <a:rPr lang="en-US" b="0" i="0" baseline="0"/>
             <a:t>: Auction Smart Contract is deployed via the Auction Deployer Smart Contract</a:t>
           </a:r>
           <a:endParaRPr lang="en-US" dirty="0"/>
@@ -5227,33 +5277,33 @@
     </dgm:pt>
   </dgm:ptLst>
   <dgm:cxnLst>
-    <dgm:cxn modelId="{095CC612-1201-4C1C-937E-60313520AED0}" type="presOf" srcId="{CDAA5682-53B8-4162-A759-27FF490D3EA0}" destId="{BB688467-C19F-409F-AEF9-39453290C283}" srcOrd="0" destOrd="0" presId="urn:microsoft.com/office/officeart/2018/2/layout/IconVerticalSolidList"/>
     <dgm:cxn modelId="{E9AC511C-B1BF-47ED-AB2B-9A2A89128723}" srcId="{83C20B4A-93A6-4570-8D0C-E2C7E0EB1B26}" destId="{2C913E6B-AB6C-495F-8194-72840CEF3FAD}" srcOrd="2" destOrd="0" parTransId="{7C2524D1-95F1-4C59-8F8A-4CEEB7E61FEF}" sibTransId="{A41CA1B1-B5FC-47B2-94DC-E0C8869BA3D4}"/>
-    <dgm:cxn modelId="{034C1E20-14B0-41A7-BB69-6289507D2D2F}" type="presOf" srcId="{7701B606-E8BF-4B4D-8DC9-31189527D0C4}" destId="{5E5554BE-4F73-45A3-8F16-AC503B40ED41}" srcOrd="0" destOrd="3" presId="urn:microsoft.com/office/officeart/2018/2/layout/IconVerticalSolidList"/>
-    <dgm:cxn modelId="{2B0C0029-3F64-4CFA-97CA-B160A484DFBB}" type="presOf" srcId="{8AB6F308-FCF1-4AAC-B9AC-37733DCC0DC4}" destId="{7592645E-90DC-4019-BEAE-7E12D2E570A2}" srcOrd="0" destOrd="0" presId="urn:microsoft.com/office/officeart/2018/2/layout/IconVerticalSolidList"/>
-    <dgm:cxn modelId="{B704AF31-9C4A-42DE-8368-251D7A50DDAE}" type="presOf" srcId="{83C20B4A-93A6-4570-8D0C-E2C7E0EB1B26}" destId="{EA26FE2B-44A2-4198-A0D1-7CCD1FF23C26}" srcOrd="0" destOrd="0" presId="urn:microsoft.com/office/officeart/2018/2/layout/IconVerticalSolidList"/>
+    <dgm:cxn modelId="{8DDB5D2E-50DD-4EB3-86BC-8DADD62F3E9A}" type="presOf" srcId="{8CE50C95-A02A-4987-8705-F773D9F03183}" destId="{5E5554BE-4F73-45A3-8F16-AC503B40ED41}" srcOrd="0" destOrd="1" presId="urn:microsoft.com/office/officeart/2018/2/layout/IconVerticalSolidList"/>
     <dgm:cxn modelId="{2CF9913A-A6CD-475A-A4FE-D9A2654803FF}" srcId="{83C20B4A-93A6-4570-8D0C-E2C7E0EB1B26}" destId="{7D8EC1AB-87DF-4E29-AC64-036E16C7032F}" srcOrd="0" destOrd="0" parTransId="{E4403918-C1FA-4DB3-9996-C60B4B7DBD59}" sibTransId="{7C02EC4E-4B38-46DC-B460-84D71BA91883}"/>
-    <dgm:cxn modelId="{0A836867-292E-484E-BB94-B055D60392BD}" type="presOf" srcId="{8CE50C95-A02A-4987-8705-F773D9F03183}" destId="{5E5554BE-4F73-45A3-8F16-AC503B40ED41}" srcOrd="0" destOrd="1" presId="urn:microsoft.com/office/officeart/2018/2/layout/IconVerticalSolidList"/>
-    <dgm:cxn modelId="{9531BA6B-1EFE-4081-8C9C-39EAE0889060}" type="presOf" srcId="{043B3176-E012-4C25-B060-778940DB1539}" destId="{5E5554BE-4F73-45A3-8F16-AC503B40ED41}" srcOrd="0" destOrd="4" presId="urn:microsoft.com/office/officeart/2018/2/layout/IconVerticalSolidList"/>
-    <dgm:cxn modelId="{77BB218F-06AA-4445-8600-912D7FD5FCD9}" type="presOf" srcId="{2C913E6B-AB6C-495F-8194-72840CEF3FAD}" destId="{5E5554BE-4F73-45A3-8F16-AC503B40ED41}" srcOrd="0" destOrd="2" presId="urn:microsoft.com/office/officeart/2018/2/layout/IconVerticalSolidList"/>
+    <dgm:cxn modelId="{32404D5F-E6B7-48AA-8A7D-1DBB74386B6A}" type="presOf" srcId="{2C913E6B-AB6C-495F-8194-72840CEF3FAD}" destId="{5E5554BE-4F73-45A3-8F16-AC503B40ED41}" srcOrd="0" destOrd="2" presId="urn:microsoft.com/office/officeart/2018/2/layout/IconVerticalSolidList"/>
+    <dgm:cxn modelId="{7E4A264B-5B02-4715-BA55-2E8A64688926}" type="presOf" srcId="{043B3176-E012-4C25-B060-778940DB1539}" destId="{5E5554BE-4F73-45A3-8F16-AC503B40ED41}" srcOrd="0" destOrd="4" presId="urn:microsoft.com/office/officeart/2018/2/layout/IconVerticalSolidList"/>
+    <dgm:cxn modelId="{26AA9B73-E16B-49E0-B6C3-7EFBCE9822F6}" type="presOf" srcId="{83C20B4A-93A6-4570-8D0C-E2C7E0EB1B26}" destId="{EA26FE2B-44A2-4198-A0D1-7CCD1FF23C26}" srcOrd="0" destOrd="0" presId="urn:microsoft.com/office/officeart/2018/2/layout/IconVerticalSolidList"/>
+    <dgm:cxn modelId="{B451AA7A-9F5F-470D-8ED8-17F8E4349C6C}" type="presOf" srcId="{7701B606-E8BF-4B4D-8DC9-31189527D0C4}" destId="{5E5554BE-4F73-45A3-8F16-AC503B40ED41}" srcOrd="0" destOrd="3" presId="urn:microsoft.com/office/officeart/2018/2/layout/IconVerticalSolidList"/>
     <dgm:cxn modelId="{318AF794-04D6-483C-9BAE-2C887DD83C0C}" srcId="{83C20B4A-93A6-4570-8D0C-E2C7E0EB1B26}" destId="{043B3176-E012-4C25-B060-778940DB1539}" srcOrd="4" destOrd="0" parTransId="{2D732F6D-D267-40F1-A389-006372DCEE71}" sibTransId="{701534DC-2C35-4F97-A833-6EC33D097F9A}"/>
     <dgm:cxn modelId="{40FA6D9F-73D8-4295-A6EF-ACADA0C1F3DA}" srcId="{83C20B4A-93A6-4570-8D0C-E2C7E0EB1B26}" destId="{7701B606-E8BF-4B4D-8DC9-31189527D0C4}" srcOrd="3" destOrd="0" parTransId="{2C4B43C7-9ED1-4D5B-90C1-3D2267F99744}" sibTransId="{8E66A10E-3F1E-4323-932E-9093840ACFB5}"/>
+    <dgm:cxn modelId="{458604A1-9B7F-4A7A-876C-6CE3505E299B}" type="presOf" srcId="{7D8EC1AB-87DF-4E29-AC64-036E16C7032F}" destId="{5E5554BE-4F73-45A3-8F16-AC503B40ED41}" srcOrd="0" destOrd="0" presId="urn:microsoft.com/office/officeart/2018/2/layout/IconVerticalSolidList"/>
     <dgm:cxn modelId="{F44F14B5-DE74-40CA-AC6D-D772162BCAC3}" srcId="{83C20B4A-93A6-4570-8D0C-E2C7E0EB1B26}" destId="{8CE50C95-A02A-4987-8705-F773D9F03183}" srcOrd="1" destOrd="0" parTransId="{50E9B4BD-1918-4EF1-A311-C6F682DC0A5D}" sibTransId="{03137D31-A743-4E26-BCD0-B470A9FFEEBD}"/>
-    <dgm:cxn modelId="{6F58EDB7-3A8D-4ED1-AC75-8DDEF40889AC}" type="presOf" srcId="{7D8EC1AB-87DF-4E29-AC64-036E16C7032F}" destId="{5E5554BE-4F73-45A3-8F16-AC503B40ED41}" srcOrd="0" destOrd="0" presId="urn:microsoft.com/office/officeart/2018/2/layout/IconVerticalSolidList"/>
+    <dgm:cxn modelId="{0B1F71C8-5546-4EF1-8361-59D56F42B59E}" type="presOf" srcId="{CDAA5682-53B8-4162-A759-27FF490D3EA0}" destId="{BB688467-C19F-409F-AEF9-39453290C283}" srcOrd="0" destOrd="0" presId="urn:microsoft.com/office/officeart/2018/2/layout/IconVerticalSolidList"/>
     <dgm:cxn modelId="{882D1ECA-DEBB-44D9-9837-B7296F4AE817}" srcId="{8AB6F308-FCF1-4AAC-B9AC-37733DCC0DC4}" destId="{83C20B4A-93A6-4570-8D0C-E2C7E0EB1B26}" srcOrd="0" destOrd="0" parTransId="{C17B312B-85CE-441F-B05E-F6B2D2877F1D}" sibTransId="{AE26CF7F-2E6F-481D-8522-67075D2016D1}"/>
+    <dgm:cxn modelId="{BE62DECA-742E-4795-8033-B6AF0296416E}" type="presOf" srcId="{8AB6F308-FCF1-4AAC-B9AC-37733DCC0DC4}" destId="{7592645E-90DC-4019-BEAE-7E12D2E570A2}" srcOrd="0" destOrd="0" presId="urn:microsoft.com/office/officeart/2018/2/layout/IconVerticalSolidList"/>
     <dgm:cxn modelId="{08033CF7-16CD-469A-B587-278B1B89397F}" srcId="{8AB6F308-FCF1-4AAC-B9AC-37733DCC0DC4}" destId="{CDAA5682-53B8-4162-A759-27FF490D3EA0}" srcOrd="1" destOrd="0" parTransId="{BCA94332-E41E-4C30-993E-959332FB4CA7}" sibTransId="{47D446F3-501E-487E-BE0E-CC536A782E9F}"/>
-    <dgm:cxn modelId="{89CCFABB-E49C-440F-861E-01989B74A2D7}" type="presParOf" srcId="{7592645E-90DC-4019-BEAE-7E12D2E570A2}" destId="{D7967FEA-6CD1-444E-9F0B-E62FD70B9F0F}" srcOrd="0" destOrd="0" presId="urn:microsoft.com/office/officeart/2018/2/layout/IconVerticalSolidList"/>
-    <dgm:cxn modelId="{0E0F4E8A-B531-4513-A045-340BC56BC165}" type="presParOf" srcId="{D7967FEA-6CD1-444E-9F0B-E62FD70B9F0F}" destId="{B226A255-440C-44E0-A84A-0973E3DB3A8D}" srcOrd="0" destOrd="0" presId="urn:microsoft.com/office/officeart/2018/2/layout/IconVerticalSolidList"/>
-    <dgm:cxn modelId="{9B4B7E8F-7B60-477F-99B6-4880F997B3D6}" type="presParOf" srcId="{D7967FEA-6CD1-444E-9F0B-E62FD70B9F0F}" destId="{CBDB0C8D-A1B6-4452-B342-783558DD9492}" srcOrd="1" destOrd="0" presId="urn:microsoft.com/office/officeart/2018/2/layout/IconVerticalSolidList"/>
-    <dgm:cxn modelId="{4D10F875-E7F2-48C7-85DC-D4427F20F9BF}" type="presParOf" srcId="{D7967FEA-6CD1-444E-9F0B-E62FD70B9F0F}" destId="{20479F87-12D9-40B5-849A-B8EEA2550022}" srcOrd="2" destOrd="0" presId="urn:microsoft.com/office/officeart/2018/2/layout/IconVerticalSolidList"/>
-    <dgm:cxn modelId="{0F83A3EC-1B15-41C0-A7D5-06DE204D3542}" type="presParOf" srcId="{D7967FEA-6CD1-444E-9F0B-E62FD70B9F0F}" destId="{EA26FE2B-44A2-4198-A0D1-7CCD1FF23C26}" srcOrd="3" destOrd="0" presId="urn:microsoft.com/office/officeart/2018/2/layout/IconVerticalSolidList"/>
-    <dgm:cxn modelId="{CED0650C-43E6-42AA-B7F8-09AFDF591528}" type="presParOf" srcId="{D7967FEA-6CD1-444E-9F0B-E62FD70B9F0F}" destId="{5E5554BE-4F73-45A3-8F16-AC503B40ED41}" srcOrd="4" destOrd="0" presId="urn:microsoft.com/office/officeart/2018/2/layout/IconVerticalSolidList"/>
-    <dgm:cxn modelId="{BBD9AF79-8BF6-4DAB-8A79-C0FD155E5FC4}" type="presParOf" srcId="{7592645E-90DC-4019-BEAE-7E12D2E570A2}" destId="{C3540B8A-6D75-45C9-963D-E53D4E1305BB}" srcOrd="1" destOrd="0" presId="urn:microsoft.com/office/officeart/2018/2/layout/IconVerticalSolidList"/>
-    <dgm:cxn modelId="{9997C04F-633C-4E4B-A4ED-D4A0BFC1B130}" type="presParOf" srcId="{7592645E-90DC-4019-BEAE-7E12D2E570A2}" destId="{22D93C91-547F-466C-9822-C6074B2AB149}" srcOrd="2" destOrd="0" presId="urn:microsoft.com/office/officeart/2018/2/layout/IconVerticalSolidList"/>
-    <dgm:cxn modelId="{5062FFA1-19FB-4461-8B98-9FFC45667A2E}" type="presParOf" srcId="{22D93C91-547F-466C-9822-C6074B2AB149}" destId="{21334611-4C75-4183-8585-5A0FDF696521}" srcOrd="0" destOrd="0" presId="urn:microsoft.com/office/officeart/2018/2/layout/IconVerticalSolidList"/>
-    <dgm:cxn modelId="{EFFCB5E3-8CF5-4EA3-9B0F-37340050A502}" type="presParOf" srcId="{22D93C91-547F-466C-9822-C6074B2AB149}" destId="{CAEE0621-7AF4-442B-8893-A7CE7B7C9FB3}" srcOrd="1" destOrd="0" presId="urn:microsoft.com/office/officeart/2018/2/layout/IconVerticalSolidList"/>
-    <dgm:cxn modelId="{98FE15BD-923C-4DA8-A032-C870DF39ABDF}" type="presParOf" srcId="{22D93C91-547F-466C-9822-C6074B2AB149}" destId="{DFE44B0A-D03C-4B3C-B0F9-4222EE9C981B}" srcOrd="2" destOrd="0" presId="urn:microsoft.com/office/officeart/2018/2/layout/IconVerticalSolidList"/>
-    <dgm:cxn modelId="{A45DC422-6DDF-48C6-92C6-FD6EFA188A23}" type="presParOf" srcId="{22D93C91-547F-466C-9822-C6074B2AB149}" destId="{BB688467-C19F-409F-AEF9-39453290C283}" srcOrd="3" destOrd="0" presId="urn:microsoft.com/office/officeart/2018/2/layout/IconVerticalSolidList"/>
+    <dgm:cxn modelId="{0AE9F210-F272-46F6-9192-C9184A00F7F9}" type="presParOf" srcId="{7592645E-90DC-4019-BEAE-7E12D2E570A2}" destId="{D7967FEA-6CD1-444E-9F0B-E62FD70B9F0F}" srcOrd="0" destOrd="0" presId="urn:microsoft.com/office/officeart/2018/2/layout/IconVerticalSolidList"/>
+    <dgm:cxn modelId="{AAAE2F11-872C-41BB-97E2-A5BCE201D3FF}" type="presParOf" srcId="{D7967FEA-6CD1-444E-9F0B-E62FD70B9F0F}" destId="{B226A255-440C-44E0-A84A-0973E3DB3A8D}" srcOrd="0" destOrd="0" presId="urn:microsoft.com/office/officeart/2018/2/layout/IconVerticalSolidList"/>
+    <dgm:cxn modelId="{F315C29B-C6D7-487A-A85F-0DA78CD0B121}" type="presParOf" srcId="{D7967FEA-6CD1-444E-9F0B-E62FD70B9F0F}" destId="{CBDB0C8D-A1B6-4452-B342-783558DD9492}" srcOrd="1" destOrd="0" presId="urn:microsoft.com/office/officeart/2018/2/layout/IconVerticalSolidList"/>
+    <dgm:cxn modelId="{3A7A0A7B-977A-4193-9031-20D619A629B0}" type="presParOf" srcId="{D7967FEA-6CD1-444E-9F0B-E62FD70B9F0F}" destId="{20479F87-12D9-40B5-849A-B8EEA2550022}" srcOrd="2" destOrd="0" presId="urn:microsoft.com/office/officeart/2018/2/layout/IconVerticalSolidList"/>
+    <dgm:cxn modelId="{24D72FB2-EAB2-420F-9635-D9D9430F0E19}" type="presParOf" srcId="{D7967FEA-6CD1-444E-9F0B-E62FD70B9F0F}" destId="{EA26FE2B-44A2-4198-A0D1-7CCD1FF23C26}" srcOrd="3" destOrd="0" presId="urn:microsoft.com/office/officeart/2018/2/layout/IconVerticalSolidList"/>
+    <dgm:cxn modelId="{2CC7BBF4-37E2-4FA6-BB94-CA5C6A5A6683}" type="presParOf" srcId="{D7967FEA-6CD1-444E-9F0B-E62FD70B9F0F}" destId="{5E5554BE-4F73-45A3-8F16-AC503B40ED41}" srcOrd="4" destOrd="0" presId="urn:microsoft.com/office/officeart/2018/2/layout/IconVerticalSolidList"/>
+    <dgm:cxn modelId="{F8B69C7A-8D2D-4257-9765-73AF5739AD9B}" type="presParOf" srcId="{7592645E-90DC-4019-BEAE-7E12D2E570A2}" destId="{C3540B8A-6D75-45C9-963D-E53D4E1305BB}" srcOrd="1" destOrd="0" presId="urn:microsoft.com/office/officeart/2018/2/layout/IconVerticalSolidList"/>
+    <dgm:cxn modelId="{D5357C09-270D-40D5-92DE-32D3AE91EDC5}" type="presParOf" srcId="{7592645E-90DC-4019-BEAE-7E12D2E570A2}" destId="{22D93C91-547F-466C-9822-C6074B2AB149}" srcOrd="2" destOrd="0" presId="urn:microsoft.com/office/officeart/2018/2/layout/IconVerticalSolidList"/>
+    <dgm:cxn modelId="{0A0409C8-1F8C-4B66-8925-48CB348F4812}" type="presParOf" srcId="{22D93C91-547F-466C-9822-C6074B2AB149}" destId="{21334611-4C75-4183-8585-5A0FDF696521}" srcOrd="0" destOrd="0" presId="urn:microsoft.com/office/officeart/2018/2/layout/IconVerticalSolidList"/>
+    <dgm:cxn modelId="{FA7215D2-8D47-4285-8BC7-61EA717256B4}" type="presParOf" srcId="{22D93C91-547F-466C-9822-C6074B2AB149}" destId="{CAEE0621-7AF4-442B-8893-A7CE7B7C9FB3}" srcOrd="1" destOrd="0" presId="urn:microsoft.com/office/officeart/2018/2/layout/IconVerticalSolidList"/>
+    <dgm:cxn modelId="{FE692A40-B9C6-41A5-A7A9-E335F9730C09}" type="presParOf" srcId="{22D93C91-547F-466C-9822-C6074B2AB149}" destId="{DFE44B0A-D03C-4B3C-B0F9-4222EE9C981B}" srcOrd="2" destOrd="0" presId="urn:microsoft.com/office/officeart/2018/2/layout/IconVerticalSolidList"/>
+    <dgm:cxn modelId="{E1A60CAC-A7E8-4C36-9799-D4C22C14F034}" type="presParOf" srcId="{22D93C91-547F-466C-9822-C6074B2AB149}" destId="{BB688467-C19F-409F-AEF9-39453290C283}" srcOrd="3" destOrd="0" presId="urn:microsoft.com/office/officeart/2018/2/layout/IconVerticalSolidList"/>
   </dgm:cxnLst>
   <dgm:bg/>
   <dgm:whole/>
@@ -5571,14 +5621,12 @@
         <a:blipFill>
           <a:blip xmlns:r="http://schemas.openxmlformats.org/officeDocument/2006/relationships" r:embed="rId1">
             <a:extLst>
-              <a:ext uri="{28A0092B-C50C-407E-A947-70E740481C1C}">
-                <a14:useLocalDpi xmlns:a14="http://schemas.microsoft.com/office/drawing/2010/main" val="0"/>
-              </a:ext>
               <a:ext uri="{96DAC541-7B7A-43D3-8B79-37D633B846F1}">
                 <asvg:svgBlip xmlns:asvg="http://schemas.microsoft.com/office/drawing/2016/SVG/main" r:embed="rId2"/>
               </a:ext>
             </a:extLst>
           </a:blip>
+          <a:srcRect/>
           <a:stretch>
             <a:fillRect/>
           </a:stretch>
@@ -5586,7 +5634,7 @@
       </dgm:spPr>
       <dgm:extLst>
         <a:ext uri="{E40237B7-FDA0-4F09-8148-C483321AD2D9}">
-          <dgm14:cNvPr xmlns:dgm14="http://schemas.microsoft.com/office/drawing/2010/diagram" id="0" name="" descr="Gavel"/>
+          <dgm14:cNvPr xmlns:dgm14="http://schemas.microsoft.com/office/drawing/2010/diagram" id="0" name="" descr="Cmd Terminal with solid fill"/>
         </a:ext>
       </dgm:extLst>
     </dgm:pt>
@@ -5627,14 +5675,12 @@
         <a:blipFill>
           <a:blip xmlns:r="http://schemas.openxmlformats.org/officeDocument/2006/relationships" r:embed="rId3">
             <a:extLst>
-              <a:ext uri="{28A0092B-C50C-407E-A947-70E740481C1C}">
-                <a14:useLocalDpi xmlns:a14="http://schemas.microsoft.com/office/drawing/2010/main" val="0"/>
-              </a:ext>
               <a:ext uri="{96DAC541-7B7A-43D3-8B79-37D633B846F1}">
                 <asvg:svgBlip xmlns:asvg="http://schemas.microsoft.com/office/drawing/2016/SVG/main" r:embed="rId4"/>
               </a:ext>
             </a:extLst>
           </a:blip>
+          <a:srcRect/>
           <a:stretch>
             <a:fillRect/>
           </a:stretch>
@@ -5642,7 +5688,7 @@
       </dgm:spPr>
       <dgm:extLst>
         <a:ext uri="{E40237B7-FDA0-4F09-8148-C483321AD2D9}">
-          <dgm14:cNvPr xmlns:dgm14="http://schemas.microsoft.com/office/drawing/2010/diagram" id="0" name="" descr="Handshake"/>
+          <dgm14:cNvPr xmlns:dgm14="http://schemas.microsoft.com/office/drawing/2010/diagram" id="0" name="" descr="Ui Ux with solid fill"/>
         </a:ext>
       </dgm:extLst>
     </dgm:pt>
@@ -6360,14 +6406,12 @@
         <a:blipFill>
           <a:blip xmlns:r="http://schemas.openxmlformats.org/officeDocument/2006/relationships" r:embed="rId1">
             <a:extLst>
-              <a:ext uri="{28A0092B-C50C-407E-A947-70E740481C1C}">
-                <a14:useLocalDpi xmlns:a14="http://schemas.microsoft.com/office/drawing/2010/main" val="0"/>
-              </a:ext>
               <a:ext uri="{96DAC541-7B7A-43D3-8B79-37D633B846F1}">
                 <asvg:svgBlip xmlns:asvg="http://schemas.microsoft.com/office/drawing/2016/SVG/main" r:embed="rId2"/>
               </a:ext>
             </a:extLst>
           </a:blip>
+          <a:srcRect/>
           <a:stretch>
             <a:fillRect/>
           </a:stretch>
@@ -6375,7 +6419,7 @@
       </dgm:spPr>
       <dgm:extLst>
         <a:ext uri="{E40237B7-FDA0-4F09-8148-C483321AD2D9}">
-          <dgm14:cNvPr xmlns:dgm14="http://schemas.microsoft.com/office/drawing/2010/diagram" id="0" name="" descr="Wedding Rings"/>
+          <dgm14:cNvPr xmlns:dgm14="http://schemas.microsoft.com/office/drawing/2010/diagram" id="0" name="" descr="Programmer female with solid fill"/>
         </a:ext>
       </dgm:extLst>
     </dgm:pt>
@@ -6416,14 +6460,12 @@
         <a:blipFill>
           <a:blip xmlns:r="http://schemas.openxmlformats.org/officeDocument/2006/relationships" r:embed="rId3">
             <a:extLst>
-              <a:ext uri="{28A0092B-C50C-407E-A947-70E740481C1C}">
-                <a14:useLocalDpi xmlns:a14="http://schemas.microsoft.com/office/drawing/2010/main" val="0"/>
-              </a:ext>
               <a:ext uri="{96DAC541-7B7A-43D3-8B79-37D633B846F1}">
                 <asvg:svgBlip xmlns:asvg="http://schemas.microsoft.com/office/drawing/2016/SVG/main" r:embed="rId4"/>
               </a:ext>
             </a:extLst>
           </a:blip>
+          <a:srcRect/>
           <a:stretch>
             <a:fillRect/>
           </a:stretch>
@@ -6431,7 +6473,7 @@
       </dgm:spPr>
       <dgm:extLst>
         <a:ext uri="{E40237B7-FDA0-4F09-8148-C483321AD2D9}">
-          <dgm14:cNvPr xmlns:dgm14="http://schemas.microsoft.com/office/drawing/2010/diagram" id="0" name="" descr="Processor"/>
+          <dgm14:cNvPr xmlns:dgm14="http://schemas.microsoft.com/office/drawing/2010/diagram" id="0" name="" descr="Programmer male with solid fill"/>
         </a:ext>
       </dgm:extLst>
     </dgm:pt>
@@ -6622,6 +6664,9 @@
         <a:blipFill>
           <a:blip xmlns:r="http://schemas.openxmlformats.org/officeDocument/2006/relationships" r:embed="rId1">
             <a:extLst>
+              <a:ext uri="{28A0092B-C50C-407E-A947-70E740481C1C}">
+                <a14:useLocalDpi xmlns:a14="http://schemas.microsoft.com/office/drawing/2010/main" val="0"/>
+              </a:ext>
               <a:ext uri="{96DAC541-7B7A-43D3-8B79-37D633B846F1}">
                 <asvg:svgBlip xmlns:asvg="http://schemas.microsoft.com/office/drawing/2016/SVG/main" r:embed="rId2"/>
               </a:ext>
@@ -7325,7 +7370,7 @@
             <a:buNone/>
           </a:pPr>
           <a:r>
-            <a:rPr lang="en-US" sz="1500" b="0" i="0" kern="1200" baseline="0" dirty="0"/>
+            <a:rPr lang="en-US" sz="1500" b="0" i="0" kern="1200" baseline="0"/>
             <a:t>A Solidity based Auction smart contract enables participants to bid on an NFT, with the highest bidder winning the auction. The building blocks of the Auction smart contract include:</a:t>
           </a:r>
           <a:endParaRPr lang="en-US" sz="1500" kern="1200" dirty="0"/>
@@ -7386,7 +7431,7 @@
             <a:buNone/>
           </a:pPr>
           <a:r>
-            <a:rPr lang="en-US" sz="1100" b="1" i="0" kern="1200" baseline="0" dirty="0">
+            <a:rPr lang="en-US" sz="1100" b="1" i="0" kern="1200" baseline="0">
               <a:solidFill>
                 <a:schemeClr val="accent2">
                   <a:lumMod val="75000"/>
@@ -7396,23 +7441,23 @@
             <a:t>Start Function:</a:t>
           </a:r>
           <a:r>
-            <a:rPr lang="en-US" sz="1100" b="0" i="0" kern="1200" baseline="0" dirty="0"/>
+            <a:rPr lang="en-US" sz="1100" b="0" i="0" kern="1200" baseline="0"/>
             <a:t> Defines the contract's </a:t>
           </a:r>
           <a:r>
-            <a:rPr lang="en-US" sz="1100" b="0" i="1" kern="1200" baseline="0" dirty="0"/>
+            <a:rPr lang="en-US" sz="1100" b="0" i="1" kern="1200" baseline="0"/>
             <a:t>variables</a:t>
           </a:r>
           <a:r>
-            <a:rPr lang="en-US" sz="1100" b="0" i="0" kern="1200" baseline="0" dirty="0"/>
+            <a:rPr lang="en-US" sz="1100" b="0" i="0" kern="1200" baseline="0"/>
             <a:t> and their initial values, such as the token (NFT Registry smart contract), token Id, highest bid, auction end time. </a:t>
           </a:r>
           <a:r>
-            <a:rPr lang="en-US" sz="1100" b="0" i="1" u="none" kern="1200" baseline="0" dirty="0"/>
+            <a:rPr lang="en-US" sz="1100" b="0" i="1" u="none" kern="1200" baseline="0"/>
             <a:t>Conditions</a:t>
           </a:r>
           <a:r>
-            <a:rPr lang="en-US" sz="1100" b="0" i="0" kern="1200" baseline="0" dirty="0"/>
+            <a:rPr lang="en-US" sz="1100" b="0" i="0" kern="1200" baseline="0"/>
             <a:t> for initiation – auction is not in progress; Initiated by the NFT Seller only.</a:t>
           </a:r>
           <a:endParaRPr lang="en-US" sz="1100" kern="1200" dirty="0"/>
@@ -7431,7 +7476,7 @@
             <a:buNone/>
           </a:pPr>
           <a:r>
-            <a:rPr lang="en-US" sz="1100" b="1" i="0" kern="1200" baseline="0" dirty="0">
+            <a:rPr lang="en-US" sz="1100" b="1" i="0" kern="1200" baseline="0">
               <a:solidFill>
                 <a:schemeClr val="accent2">
                   <a:lumMod val="75000"/>
@@ -7441,7 +7486,7 @@
             <a:t>Bid Function: </a:t>
           </a:r>
           <a:r>
-            <a:rPr lang="en-US" sz="1100" b="0" i="0" kern="1200" baseline="0" dirty="0">
+            <a:rPr lang="en-US" sz="1100" b="0" i="0" kern="1200" baseline="0">
               <a:solidFill>
                 <a:schemeClr val="tx1"/>
               </a:solidFill>
@@ -7449,15 +7494,15 @@
             <a:t>A</a:t>
           </a:r>
           <a:r>
-            <a:rPr lang="en-US" sz="1100" b="0" i="0" kern="1200" baseline="0" dirty="0"/>
+            <a:rPr lang="en-US" sz="1100" b="0" i="0" kern="1200" baseline="0"/>
             <a:t>llows participants to place bids on the auction. When a bid is made, the function verifies that the bid amount is greater than the current highest bid and updates the highest bid and bidder accordingly. </a:t>
           </a:r>
           <a:r>
-            <a:rPr lang="en-US" sz="1100" b="0" i="1" u="none" kern="1200" baseline="0" dirty="0"/>
+            <a:rPr lang="en-US" sz="1100" b="0" i="1" u="none" kern="1200" baseline="0"/>
             <a:t>Conditions</a:t>
           </a:r>
           <a:r>
-            <a:rPr lang="en-US" sz="1100" b="0" i="0" kern="1200" baseline="0" dirty="0"/>
+            <a:rPr lang="en-US" sz="1100" b="0" i="0" kern="1200" baseline="0"/>
             <a:t> for initiation – auction is in progress; a bidder’s balance must be higher than the bid; the seller cannot place bids.</a:t>
           </a:r>
           <a:endParaRPr lang="en-US" sz="1100" kern="1200" dirty="0"/>
@@ -7476,7 +7521,7 @@
             <a:buNone/>
           </a:pPr>
           <a:r>
-            <a:rPr lang="en-US" sz="1100" b="1" i="0" kern="1200" baseline="0" dirty="0">
+            <a:rPr lang="en-US" sz="1100" b="1" i="0" kern="1200" baseline="0">
               <a:solidFill>
                 <a:schemeClr val="accent2">
                   <a:lumMod val="75000"/>
@@ -7486,15 +7531,15 @@
             <a:t>End Function:</a:t>
           </a:r>
           <a:r>
-            <a:rPr lang="en-US" sz="1100" b="0" i="0" kern="1200" baseline="0" dirty="0"/>
+            <a:rPr lang="en-US" sz="1100" b="0" i="0" kern="1200" baseline="0"/>
             <a:t> Ends the auction after the pre-defined period. When the function is called, it </a:t>
           </a:r>
           <a:r>
-            <a:rPr lang="en-US" sz="1100" b="0" i="1" kern="1200" baseline="0" dirty="0"/>
+            <a:rPr lang="en-US" sz="1100" b="0" i="1" kern="1200" baseline="0"/>
             <a:t>checks if the bidding period has ended</a:t>
           </a:r>
           <a:r>
-            <a:rPr lang="en-US" sz="1100" b="0" i="0" kern="1200" baseline="0" dirty="0"/>
+            <a:rPr lang="en-US" sz="1100" b="0" i="0" kern="1200" baseline="0"/>
             <a:t>. It then transfers the highest bid amount to the Seller’s address and the NFT token to the highest bidder. If there are no bids, the NFT will be returned to the Seller. After the transfers, the function marks the auction as ended.</a:t>
           </a:r>
           <a:endParaRPr lang="en-US" sz="1100" kern="1200" dirty="0"/>
@@ -7513,7 +7558,7 @@
             <a:buNone/>
           </a:pPr>
           <a:r>
-            <a:rPr lang="en-US" sz="1100" b="1" i="0" kern="1200" baseline="0" dirty="0">
+            <a:rPr lang="en-US" sz="1100" b="1" i="0" kern="1200" baseline="0">
               <a:solidFill>
                 <a:schemeClr val="accent2">
                   <a:lumMod val="75000"/>
@@ -7523,7 +7568,7 @@
             <a:t>Withdraw Function: </a:t>
           </a:r>
           <a:r>
-            <a:rPr lang="en-US" sz="1100" b="0" i="0" kern="1200" baseline="0" dirty="0">
+            <a:rPr lang="en-US" sz="1100" b="0" i="0" kern="1200" baseline="0">
               <a:solidFill>
                 <a:schemeClr val="tx1"/>
               </a:solidFill>
@@ -7531,15 +7576,15 @@
             <a:t>A</a:t>
           </a:r>
           <a:r>
-            <a:rPr lang="en-US" sz="1100" b="0" i="0" kern="1200" baseline="0" dirty="0"/>
+            <a:rPr lang="en-US" sz="1100" b="0" i="0" kern="1200" baseline="0"/>
             <a:t>llows bidders to withdraw their bids if they </a:t>
           </a:r>
           <a:r>
-            <a:rPr lang="en-US" sz="1100" b="0" i="1" kern="1200" baseline="0" dirty="0"/>
+            <a:rPr lang="en-US" sz="1100" b="0" i="1" kern="1200" baseline="0"/>
             <a:t>are not the highest bidder</a:t>
           </a:r>
           <a:r>
-            <a:rPr lang="en-US" sz="1100" b="0" i="0" kern="1200" baseline="0" dirty="0"/>
+            <a:rPr lang="en-US" sz="1100" b="0" i="0" kern="1200" baseline="0"/>
             <a:t>. The function checks the amount of the bid and transfers it back to the bidder's address. Withdrawals are allowed during and after the auction period.</a:t>
           </a:r>
           <a:endParaRPr lang="en-US" sz="1100" kern="1200" dirty="0"/>
@@ -7558,7 +7603,7 @@
             <a:buNone/>
           </a:pPr>
           <a:r>
-            <a:rPr lang="en-US" sz="1100" b="1" i="0" kern="1200" baseline="0" dirty="0">
+            <a:rPr lang="en-US" sz="1100" b="1" i="0" kern="1200" baseline="0">
               <a:solidFill>
                 <a:schemeClr val="accent2">
                   <a:lumMod val="75000"/>
@@ -7568,7 +7613,7 @@
             <a:t>Event Emission: </a:t>
           </a:r>
           <a:r>
-            <a:rPr lang="en-US" sz="1100" b="0" i="0" kern="1200" baseline="0" dirty="0"/>
+            <a:rPr lang="en-US" sz="1100" b="0" i="0" kern="1200" baseline="0"/>
             <a:t>Each function above emits an event that allows to track the auction's progress and enables users to monitor different stages of the auction.</a:t>
           </a:r>
           <a:endParaRPr lang="en-US" sz="1100" kern="1200" dirty="0"/>
@@ -7728,11 +7773,11 @@
             <a:buNone/>
           </a:pPr>
           <a:r>
-            <a:rPr lang="en-US" sz="1500" b="1" i="0" kern="1200" baseline="0" dirty="0"/>
+            <a:rPr lang="en-US" sz="1500" b="1" i="0" kern="1200" baseline="0"/>
             <a:t>Admin</a:t>
           </a:r>
           <a:r>
-            <a:rPr lang="en-US" sz="1500" b="0" i="0" kern="1200" baseline="0" dirty="0"/>
+            <a:rPr lang="en-US" sz="1500" b="0" i="0" kern="1200" baseline="0"/>
             <a:t>: NFT Seller is the administrator</a:t>
           </a:r>
         </a:p>
@@ -7750,11 +7795,11 @@
             <a:buNone/>
           </a:pPr>
           <a:r>
-            <a:rPr lang="en-US" sz="1500" b="1" i="0" kern="1200" baseline="0" dirty="0"/>
+            <a:rPr lang="en-US" sz="1500" b="1" i="0" kern="1200" baseline="0"/>
             <a:t>Deployment</a:t>
           </a:r>
           <a:r>
-            <a:rPr lang="en-US" sz="1500" b="0" i="0" kern="1200" baseline="0" dirty="0"/>
+            <a:rPr lang="en-US" sz="1500" b="0" i="0" kern="1200" baseline="0"/>
             <a:t>: Auction Smart Contract is deployed via the Auction Deployer Smart Contract</a:t>
           </a:r>
           <a:endParaRPr lang="en-US" sz="1500" kern="1200" dirty="0"/>
@@ -7835,14 +7880,12 @@
         <a:blipFill>
           <a:blip xmlns:r="http://schemas.openxmlformats.org/officeDocument/2006/relationships" r:embed="rId1">
             <a:extLst>
-              <a:ext uri="{28A0092B-C50C-407E-A947-70E740481C1C}">
-                <a14:useLocalDpi xmlns:a14="http://schemas.microsoft.com/office/drawing/2010/main" val="0"/>
-              </a:ext>
               <a:ext uri="{96DAC541-7B7A-43D3-8B79-37D633B846F1}">
                 <asvg:svgBlip xmlns:asvg="http://schemas.microsoft.com/office/drawing/2016/SVG/main" r:embed="rId2"/>
               </a:ext>
             </a:extLst>
           </a:blip>
+          <a:srcRect/>
           <a:stretch>
             <a:fillRect/>
           </a:stretch>
@@ -8185,14 +8228,12 @@
         <a:blipFill>
           <a:blip xmlns:r="http://schemas.openxmlformats.org/officeDocument/2006/relationships" r:embed="rId3">
             <a:extLst>
-              <a:ext uri="{28A0092B-C50C-407E-A947-70E740481C1C}">
-                <a14:useLocalDpi xmlns:a14="http://schemas.microsoft.com/office/drawing/2010/main" val="0"/>
-              </a:ext>
               <a:ext uri="{96DAC541-7B7A-43D3-8B79-37D633B846F1}">
                 <asvg:svgBlip xmlns:asvg="http://schemas.microsoft.com/office/drawing/2016/SVG/main" r:embed="rId4"/>
               </a:ext>
             </a:extLst>
           </a:blip>
+          <a:srcRect/>
           <a:stretch>
             <a:fillRect/>
           </a:stretch>
@@ -8856,14 +8897,12 @@
         <a:blipFill>
           <a:blip xmlns:r="http://schemas.openxmlformats.org/officeDocument/2006/relationships" r:embed="rId1">
             <a:extLst>
-              <a:ext uri="{28A0092B-C50C-407E-A947-70E740481C1C}">
-                <a14:useLocalDpi xmlns:a14="http://schemas.microsoft.com/office/drawing/2010/main" val="0"/>
-              </a:ext>
               <a:ext uri="{96DAC541-7B7A-43D3-8B79-37D633B846F1}">
                 <asvg:svgBlip xmlns:asvg="http://schemas.microsoft.com/office/drawing/2016/SVG/main" r:embed="rId2"/>
               </a:ext>
             </a:extLst>
           </a:blip>
+          <a:srcRect/>
           <a:stretch>
             <a:fillRect/>
           </a:stretch>
@@ -9077,14 +9116,12 @@
         <a:blipFill>
           <a:blip xmlns:r="http://schemas.openxmlformats.org/officeDocument/2006/relationships" r:embed="rId3">
             <a:extLst>
-              <a:ext uri="{28A0092B-C50C-407E-A947-70E740481C1C}">
-                <a14:useLocalDpi xmlns:a14="http://schemas.microsoft.com/office/drawing/2010/main" val="0"/>
-              </a:ext>
               <a:ext uri="{96DAC541-7B7A-43D3-8B79-37D633B846F1}">
                 <asvg:svgBlip xmlns:asvg="http://schemas.microsoft.com/office/drawing/2016/SVG/main" r:embed="rId4"/>
               </a:ext>
             </a:extLst>
           </a:blip>
+          <a:srcRect/>
           <a:stretch>
             <a:fillRect/>
           </a:stretch>
@@ -16252,7 +16289,7 @@
           <a:p>
             <a:fld id="{B634EE48-03CC-4D00-B145-A19103A86E2C}" type="datetimeFigureOut">
               <a:rPr lang="en-US" smtClean="0"/>
-              <a:t>5/15/2023</a:t>
+              <a:t>5/16/2023</a:t>
             </a:fld>
             <a:endParaRPr lang="en-US"/>
           </a:p>
@@ -16450,7 +16487,7 @@
           <a:p>
             <a:fld id="{B634EE48-03CC-4D00-B145-A19103A86E2C}" type="datetimeFigureOut">
               <a:rPr lang="en-US" smtClean="0"/>
-              <a:t>5/15/2023</a:t>
+              <a:t>5/16/2023</a:t>
             </a:fld>
             <a:endParaRPr lang="en-US"/>
           </a:p>
@@ -16658,7 +16695,7 @@
           <a:p>
             <a:fld id="{B634EE48-03CC-4D00-B145-A19103A86E2C}" type="datetimeFigureOut">
               <a:rPr lang="en-US" smtClean="0"/>
-              <a:t>5/15/2023</a:t>
+              <a:t>5/16/2023</a:t>
             </a:fld>
             <a:endParaRPr lang="en-US"/>
           </a:p>
@@ -16856,7 +16893,7 @@
           <a:p>
             <a:fld id="{63D456BD-52B8-4176-8486-7C75A30CFD68}" type="datetimeFigureOut">
               <a:rPr lang="en-US" smtClean="0"/>
-              <a:t>5/15/2023</a:t>
+              <a:t>5/16/2023</a:t>
             </a:fld>
             <a:endParaRPr lang="en-US"/>
           </a:p>
@@ -17054,7 +17091,7 @@
           <a:p>
             <a:fld id="{B634EE48-03CC-4D00-B145-A19103A86E2C}" type="datetimeFigureOut">
               <a:rPr lang="en-US" smtClean="0"/>
-              <a:t>5/15/2023</a:t>
+              <a:t>5/16/2023</a:t>
             </a:fld>
             <a:endParaRPr lang="en-US"/>
           </a:p>
@@ -17329,7 +17366,7 @@
           <a:p>
             <a:fld id="{B634EE48-03CC-4D00-B145-A19103A86E2C}" type="datetimeFigureOut">
               <a:rPr lang="en-US" smtClean="0"/>
-              <a:t>5/15/2023</a:t>
+              <a:t>5/16/2023</a:t>
             </a:fld>
             <a:endParaRPr lang="en-US"/>
           </a:p>
@@ -17594,7 +17631,7 @@
           <a:p>
             <a:fld id="{B634EE48-03CC-4D00-B145-A19103A86E2C}" type="datetimeFigureOut">
               <a:rPr lang="en-US" smtClean="0"/>
-              <a:t>5/15/2023</a:t>
+              <a:t>5/16/2023</a:t>
             </a:fld>
             <a:endParaRPr lang="en-US"/>
           </a:p>
@@ -18006,7 +18043,7 @@
           <a:p>
             <a:fld id="{B634EE48-03CC-4D00-B145-A19103A86E2C}" type="datetimeFigureOut">
               <a:rPr lang="en-US" smtClean="0"/>
-              <a:t>5/15/2023</a:t>
+              <a:t>5/16/2023</a:t>
             </a:fld>
             <a:endParaRPr lang="en-US"/>
           </a:p>
@@ -18147,7 +18184,7 @@
           <a:p>
             <a:fld id="{B634EE48-03CC-4D00-B145-A19103A86E2C}" type="datetimeFigureOut">
               <a:rPr lang="en-US" smtClean="0"/>
-              <a:t>5/15/2023</a:t>
+              <a:t>5/16/2023</a:t>
             </a:fld>
             <a:endParaRPr lang="en-US"/>
           </a:p>
@@ -18260,7 +18297,7 @@
           <a:p>
             <a:fld id="{B634EE48-03CC-4D00-B145-A19103A86E2C}" type="datetimeFigureOut">
               <a:rPr lang="en-US" smtClean="0"/>
-              <a:t>5/15/2023</a:t>
+              <a:t>5/16/2023</a:t>
             </a:fld>
             <a:endParaRPr lang="en-US"/>
           </a:p>
@@ -18571,7 +18608,7 @@
           <a:p>
             <a:fld id="{B634EE48-03CC-4D00-B145-A19103A86E2C}" type="datetimeFigureOut">
               <a:rPr lang="en-US" smtClean="0"/>
-              <a:t>5/15/2023</a:t>
+              <a:t>5/16/2023</a:t>
             </a:fld>
             <a:endParaRPr lang="en-US"/>
           </a:p>
@@ -18859,7 +18896,7 @@
           <a:p>
             <a:fld id="{B634EE48-03CC-4D00-B145-A19103A86E2C}" type="datetimeFigureOut">
               <a:rPr lang="en-US" smtClean="0"/>
-              <a:t>5/15/2023</a:t>
+              <a:t>5/16/2023</a:t>
             </a:fld>
             <a:endParaRPr lang="en-US"/>
           </a:p>
@@ -19100,7 +19137,7 @@
           <a:p>
             <a:fld id="{B634EE48-03CC-4D00-B145-A19103A86E2C}" type="datetimeFigureOut">
               <a:rPr lang="en-US" smtClean="0"/>
-              <a:t>5/15/2023</a:t>
+              <a:t>5/16/2023</a:t>
             </a:fld>
             <a:endParaRPr lang="en-US"/>
           </a:p>
@@ -19949,7 +19986,7 @@
           <p:nvPr>
             <p:extLst>
               <p:ext uri="{D42A27DB-BD31-4B8C-83A1-F6EECF244321}">
-                <p14:modId xmlns:p14="http://schemas.microsoft.com/office/powerpoint/2010/main" val="198667218"/>
+                <p14:modId xmlns:p14="http://schemas.microsoft.com/office/powerpoint/2010/main" val="3293927169"/>
               </p:ext>
             </p:extLst>
           </p:nvPr>
@@ -20017,7 +20054,7 @@
           <a:p>
             <a:pPr marR="0" rtl="0"/>
             <a:r>
-              <a:rPr lang="en-US" b="0" i="0" u="none" strike="noStrike" baseline="0" dirty="0">
+              <a:rPr lang="en-US" b="0" i="0" u="none" strike="noStrike" baseline="0">
                 <a:solidFill>
                   <a:srgbClr val="000000"/>
                 </a:solidFill>
@@ -20025,6 +20062,12 @@
               </a:rPr>
               <a:t>Auction Smart Contract</a:t>
             </a:r>
+            <a:endParaRPr lang="en-US" b="0" i="0" u="none" strike="noStrike" baseline="0" dirty="0">
+              <a:solidFill>
+                <a:srgbClr val="000000"/>
+              </a:solidFill>
+              <a:latin typeface="Segoe UI" panose="020B0502040204020203" pitchFamily="34" charset="0"/>
+            </a:endParaRPr>
           </a:p>
         </p:txBody>
       </p:sp>
@@ -20041,7 +20084,7 @@
           <p:nvPr>
             <p:extLst>
               <p:ext uri="{D42A27DB-BD31-4B8C-83A1-F6EECF244321}">
-                <p14:modId xmlns:p14="http://schemas.microsoft.com/office/powerpoint/2010/main" val="2353654667"/>
+                <p14:modId xmlns:p14="http://schemas.microsoft.com/office/powerpoint/2010/main" val="2476788386"/>
               </p:ext>
             </p:extLst>
           </p:nvPr>
@@ -20133,7 +20176,7 @@
           <p:nvPr>
             <p:extLst>
               <p:ext uri="{D42A27DB-BD31-4B8C-83A1-F6EECF244321}">
-                <p14:modId xmlns:p14="http://schemas.microsoft.com/office/powerpoint/2010/main" val="269533616"/>
+                <p14:modId xmlns:p14="http://schemas.microsoft.com/office/powerpoint/2010/main" val="608721873"/>
               </p:ext>
             </p:extLst>
           </p:nvPr>
@@ -20329,7 +20372,7 @@
           <p:nvPr>
             <p:extLst>
               <p:ext uri="{D42A27DB-BD31-4B8C-83A1-F6EECF244321}">
-                <p14:modId xmlns:p14="http://schemas.microsoft.com/office/powerpoint/2010/main" val="2842957849"/>
+                <p14:modId xmlns:p14="http://schemas.microsoft.com/office/powerpoint/2010/main" val="2131166286"/>
               </p:ext>
             </p:extLst>
           </p:nvPr>

</xml_diff>